<commit_message>
Update Demo Video and Slide
</commit_message>
<xml_diff>
--- a/Final Submission/Design/Slides - Eco Bike Rental - Group 5.pptx
+++ b/Final Submission/Design/Slides - Eco Bike Rental - Group 5.pptx
@@ -255,6 +255,11 @@
               </a:ln>
               <a:effectLst/>
             </c:spPr>
+            <c:extLst>
+              <c:ext xmlns:c16="http://schemas.microsoft.com/office/drawing/2014/chart" uri="{C3380CC4-5D6E-409C-BE32-E72D297353CC}">
+                <c16:uniqueId val="{00000001-9EC1-4CD1-A97F-893FA6056850}"/>
+              </c:ext>
+            </c:extLst>
           </c:dPt>
           <c:dPt>
             <c:idx val="1"/>
@@ -270,6 +275,11 @@
               </a:ln>
               <a:effectLst/>
             </c:spPr>
+            <c:extLst>
+              <c:ext xmlns:c16="http://schemas.microsoft.com/office/drawing/2014/chart" uri="{C3380CC4-5D6E-409C-BE32-E72D297353CC}">
+                <c16:uniqueId val="{00000003-9EC1-4CD1-A97F-893FA6056850}"/>
+              </c:ext>
+            </c:extLst>
           </c:dPt>
           <c:dPt>
             <c:idx val="2"/>
@@ -307,6 +317,11 @@
               </a:ln>
               <a:effectLst/>
             </c:spPr>
+            <c:extLst>
+              <c:ext xmlns:c16="http://schemas.microsoft.com/office/drawing/2014/chart" uri="{C3380CC4-5D6E-409C-BE32-E72D297353CC}">
+                <c16:uniqueId val="{00000007-9EC1-4CD1-A97F-893FA6056850}"/>
+              </c:ext>
+            </c:extLst>
           </c:dPt>
           <c:dLbls>
             <c:spPr>
@@ -7656,7 +7671,7 @@
         <a:p>
           <a:r>
             <a:rPr lang="en-US" dirty="0"/>
-            <a:t>Design</a:t>
+            <a:t>Design Considerations</a:t>
           </a:r>
         </a:p>
       </dgm:t>
@@ -10052,7 +10067,7 @@
           </a:pPr>
           <a:r>
             <a:rPr lang="en-US" sz="3400" kern="1200" dirty="0"/>
-            <a:t>Design</a:t>
+            <a:t>Design Considerations</a:t>
           </a:r>
         </a:p>
       </dsp:txBody>
@@ -17788,13 +17803,13 @@
   <p:clrMapOvr>
     <a:overrideClrMapping bg1="dk1" tx1="lt1" bg2="dk2" tx2="lt2" accent1="accent1" accent2="accent2" accent3="accent3" accent4="accent4" accent5="accent5" accent6="accent6" hlink="hlink" folHlink="folHlink"/>
   </p:clrMapOvr>
-  <mc:AlternateContent xmlns:mc="http://schemas.openxmlformats.org/markup-compatibility/2006">
-    <mc:Choice xmlns:p15="http://schemas.microsoft.com/office/powerpoint/2012/main" Requires="p15">
+  <mc:AlternateContent xmlns:mc="http://schemas.openxmlformats.org/markup-compatibility/2006" xmlns:p15="http://schemas.microsoft.com/office/powerpoint/2012/main">
+    <mc:Choice Requires="p15">
       <p:transition xmlns:p14="http://schemas.microsoft.com/office/powerpoint/2010/main" spd="slow" p14:dur="2000">
         <p15:prstTrans prst="drape"/>
       </p:transition>
     </mc:Choice>
-    <mc:Fallback>
+    <mc:Fallback xmlns="">
       <p:transition spd="slow">
         <p:fade/>
       </p:transition>
@@ -18089,13 +18104,13 @@
   <p:clrMapOvr>
     <a:masterClrMapping/>
   </p:clrMapOvr>
-  <mc:AlternateContent xmlns:mc="http://schemas.openxmlformats.org/markup-compatibility/2006">
-    <mc:Choice xmlns:p15="http://schemas.microsoft.com/office/powerpoint/2012/main" Requires="p15">
+  <mc:AlternateContent xmlns:mc="http://schemas.openxmlformats.org/markup-compatibility/2006" xmlns:p15="http://schemas.microsoft.com/office/powerpoint/2012/main">
+    <mc:Choice Requires="p15">
       <p:transition xmlns:p14="http://schemas.microsoft.com/office/powerpoint/2010/main" spd="slow" p14:dur="2000">
         <p15:prstTrans prst="drape"/>
       </p:transition>
     </mc:Choice>
-    <mc:Fallback>
+    <mc:Fallback xmlns="">
       <p:transition spd="slow">
         <p:fade/>
       </p:transition>
@@ -19348,13 +19363,13 @@
   <p:clrMapOvr>
     <a:masterClrMapping/>
   </p:clrMapOvr>
-  <mc:AlternateContent xmlns:mc="http://schemas.openxmlformats.org/markup-compatibility/2006">
-    <mc:Choice xmlns:p15="http://schemas.microsoft.com/office/powerpoint/2012/main" Requires="p15">
+  <mc:AlternateContent xmlns:mc="http://schemas.openxmlformats.org/markup-compatibility/2006" xmlns:p15="http://schemas.microsoft.com/office/powerpoint/2012/main">
+    <mc:Choice Requires="p15">
       <p:transition xmlns:p14="http://schemas.microsoft.com/office/powerpoint/2010/main" spd="slow" p14:dur="2000">
         <p15:prstTrans prst="drape"/>
       </p:transition>
     </mc:Choice>
-    <mc:Fallback>
+    <mc:Fallback xmlns="">
       <p:transition spd="slow">
         <p:fade/>
       </p:transition>
@@ -26894,13 +26909,13 @@
   <p:clrMapOvr>
     <a:masterClrMapping/>
   </p:clrMapOvr>
-  <mc:AlternateContent xmlns:mc="http://schemas.openxmlformats.org/markup-compatibility/2006">
-    <mc:Choice xmlns:p15="http://schemas.microsoft.com/office/powerpoint/2012/main" Requires="p15">
+  <mc:AlternateContent xmlns:mc="http://schemas.openxmlformats.org/markup-compatibility/2006" xmlns:p15="http://schemas.microsoft.com/office/powerpoint/2012/main">
+    <mc:Choice Requires="p15">
       <p:transition xmlns:p14="http://schemas.microsoft.com/office/powerpoint/2010/main" spd="slow" p14:dur="2000">
         <p15:prstTrans prst="drape"/>
       </p:transition>
     </mc:Choice>
-    <mc:Fallback>
+    <mc:Fallback xmlns="">
       <p:transition spd="slow">
         <p:fade/>
       </p:transition>
@@ -26974,13 +26989,13 @@
   <p:clrMapOvr>
     <a:masterClrMapping/>
   </p:clrMapOvr>
-  <mc:AlternateContent xmlns:mc="http://schemas.openxmlformats.org/markup-compatibility/2006">
-    <mc:Choice xmlns:p14="http://schemas.microsoft.com/office/powerpoint/2010/main" Requires="p14">
+  <mc:AlternateContent xmlns:mc="http://schemas.openxmlformats.org/markup-compatibility/2006" xmlns:p14="http://schemas.microsoft.com/office/powerpoint/2010/main">
+    <mc:Choice Requires="p14">
       <p:transition spd="slow" p14:dur="800">
         <p:circle/>
       </p:transition>
     </mc:Choice>
-    <mc:Fallback>
+    <mc:Fallback xmlns="">
       <p:transition spd="slow">
         <p:circle/>
       </p:transition>
@@ -27035,7 +27050,7 @@
           <p:nvPr>
             <p:extLst>
               <p:ext uri="{D42A27DB-BD31-4B8C-83A1-F6EECF244321}">
-                <p14:modId xmlns:p14="http://schemas.microsoft.com/office/powerpoint/2010/main" val="4238188087"/>
+                <p14:modId xmlns:p14="http://schemas.microsoft.com/office/powerpoint/2010/main" val="1276354876"/>
               </p:ext>
             </p:extLst>
           </p:nvPr>
@@ -28051,13 +28066,13 @@
   <p:clrMapOvr>
     <a:masterClrMapping/>
   </p:clrMapOvr>
-  <mc:AlternateContent xmlns:mc="http://schemas.openxmlformats.org/markup-compatibility/2006">
-    <mc:Choice xmlns:p15="http://schemas.microsoft.com/office/powerpoint/2012/main" Requires="p15">
+  <mc:AlternateContent xmlns:mc="http://schemas.openxmlformats.org/markup-compatibility/2006" xmlns:p15="http://schemas.microsoft.com/office/powerpoint/2012/main">
+    <mc:Choice Requires="p15">
       <p:transition xmlns:p14="http://schemas.microsoft.com/office/powerpoint/2010/main" spd="slow" p14:dur="2000">
         <p15:prstTrans prst="drape"/>
       </p:transition>
     </mc:Choice>
-    <mc:Fallback>
+    <mc:Fallback xmlns="">
       <p:transition spd="slow">
         <p:fade/>
       </p:transition>
@@ -29145,13 +29160,13 @@
   <p:clrMapOvr>
     <a:masterClrMapping/>
   </p:clrMapOvr>
-  <mc:AlternateContent xmlns:mc="http://schemas.openxmlformats.org/markup-compatibility/2006">
-    <mc:Choice xmlns:p15="http://schemas.microsoft.com/office/powerpoint/2012/main" Requires="p15">
+  <mc:AlternateContent xmlns:mc="http://schemas.openxmlformats.org/markup-compatibility/2006" xmlns:p15="http://schemas.microsoft.com/office/powerpoint/2012/main">
+    <mc:Choice Requires="p15">
       <p:transition xmlns:p14="http://schemas.microsoft.com/office/powerpoint/2010/main" spd="slow" p14:dur="2000">
         <p15:prstTrans prst="drape"/>
       </p:transition>
     </mc:Choice>
-    <mc:Fallback>
+    <mc:Fallback xmlns="">
       <p:transition spd="slow">
         <p:fade/>
       </p:transition>
@@ -29902,14 +29917,6 @@
 </file>
 
 <file path=customXml/item1.xml><?xml version="1.0" encoding="utf-8"?>
-<p:properties xmlns:p="http://schemas.microsoft.com/office/2006/metadata/properties" xmlns:xsi="http://www.w3.org/2001/XMLSchema-instance" xmlns:pc="http://schemas.microsoft.com/office/infopath/2007/PartnerControls">
-  <documentManagement>
-    <MediaServiceKeyPoints xmlns="71af3243-3dd4-4a8d-8c0d-dd76da1f02a5" xsi:nil="true"/>
-  </documentManagement>
-</p:properties>
-</file>
-
-<file path=customXml/item2.xml><?xml version="1.0" encoding="utf-8"?>
 <ct:contentTypeSchema xmlns:ct="http://schemas.microsoft.com/office/2006/metadata/contentType" xmlns:ma="http://schemas.microsoft.com/office/2006/metadata/properties/metaAttributes" ct:_="" ma:_="" ma:contentTypeName="Document" ma:contentTypeID="0x01010079F111ED35F8CC479449609E8A0923A6" ma:contentTypeVersion="11" ma:contentTypeDescription="Create a new document." ma:contentTypeScope="" ma:versionID="9677210f24a1be23c92c90fd886aa0aa">
   <xsd:schema xmlns:xsd="http://www.w3.org/2001/XMLSchema" xmlns:xs="http://www.w3.org/2001/XMLSchema" xmlns:p="http://schemas.microsoft.com/office/2006/metadata/properties" xmlns:ns2="71af3243-3dd4-4a8d-8c0d-dd76da1f02a5" xmlns:ns3="16c05727-aa75-4e4a-9b5f-8a80a1165891" targetNamespace="http://schemas.microsoft.com/office/2006/metadata/properties" ma:root="true" ma:fieldsID="60e05723c5c1908df1a1a4ebf11d344e" ns2:_="" ns3:_="">
     <xsd:import namespace="71af3243-3dd4-4a8d-8c0d-dd76da1f02a5"/>
@@ -30120,6 +30127,14 @@
 </ct:contentTypeSchema>
 </file>
 
+<file path=customXml/item2.xml><?xml version="1.0" encoding="utf-8"?>
+<p:properties xmlns:p="http://schemas.microsoft.com/office/2006/metadata/properties" xmlns:xsi="http://www.w3.org/2001/XMLSchema-instance" xmlns:pc="http://schemas.microsoft.com/office/infopath/2007/PartnerControls">
+  <documentManagement>
+    <MediaServiceKeyPoints xmlns="71af3243-3dd4-4a8d-8c0d-dd76da1f02a5" xsi:nil="true"/>
+  </documentManagement>
+</p:properties>
+</file>
+
 <file path=customXml/item3.xml><?xml version="1.0" encoding="utf-8"?>
 <?mso-contentType ?>
 <FormTemplates xmlns="http://schemas.microsoft.com/sharepoint/v3/contenttype/forms">
@@ -30130,23 +30145,6 @@
 </file>
 
 <file path=customXml/itemProps1.xml><?xml version="1.0" encoding="utf-8"?>
-<ds:datastoreItem xmlns:ds="http://schemas.openxmlformats.org/officeDocument/2006/customXml" ds:itemID="{CC24F515-356D-4532-BE08-F6D7771916F0}">
-  <ds:schemaRefs>
-    <ds:schemaRef ds:uri="http://schemas.microsoft.com/office/2006/metadata/properties"/>
-    <ds:schemaRef ds:uri="http://schemas.openxmlformats.org/package/2006/metadata/core-properties"/>
-    <ds:schemaRef ds:uri="16c05727-aa75-4e4a-9b5f-8a80a1165891"/>
-    <ds:schemaRef ds:uri="http://purl.org/dc/terms/"/>
-    <ds:schemaRef ds:uri="http://purl.org/dc/dcmitype/"/>
-    <ds:schemaRef ds:uri="http://schemas.microsoft.com/office/2006/documentManagement/types"/>
-    <ds:schemaRef ds:uri="http://purl.org/dc/elements/1.1/"/>
-    <ds:schemaRef ds:uri="http://schemas.microsoft.com/office/infopath/2007/PartnerControls"/>
-    <ds:schemaRef ds:uri="71af3243-3dd4-4a8d-8c0d-dd76da1f02a5"/>
-    <ds:schemaRef ds:uri="http://www.w3.org/XML/1998/namespace"/>
-  </ds:schemaRefs>
-</ds:datastoreItem>
-</file>
-
-<file path=customXml/itemProps2.xml><?xml version="1.0" encoding="utf-8"?>
 <ds:datastoreItem xmlns:ds="http://schemas.openxmlformats.org/officeDocument/2006/customXml" ds:itemID="{83E04B51-1D33-4F14-BBD7-79D7D27E2EE4}">
   <ds:schemaRefs>
     <ds:schemaRef ds:uri="http://schemas.microsoft.com/office/2006/metadata/contentType"/>
@@ -30165,6 +30163,23 @@
 </ds:datastoreItem>
 </file>
 
+<file path=customXml/itemProps2.xml><?xml version="1.0" encoding="utf-8"?>
+<ds:datastoreItem xmlns:ds="http://schemas.openxmlformats.org/officeDocument/2006/customXml" ds:itemID="{CC24F515-356D-4532-BE08-F6D7771916F0}">
+  <ds:schemaRefs>
+    <ds:schemaRef ds:uri="http://schemas.microsoft.com/office/2006/metadata/properties"/>
+    <ds:schemaRef ds:uri="http://schemas.openxmlformats.org/package/2006/metadata/core-properties"/>
+    <ds:schemaRef ds:uri="16c05727-aa75-4e4a-9b5f-8a80a1165891"/>
+    <ds:schemaRef ds:uri="http://purl.org/dc/terms/"/>
+    <ds:schemaRef ds:uri="http://purl.org/dc/dcmitype/"/>
+    <ds:schemaRef ds:uri="http://schemas.microsoft.com/office/2006/documentManagement/types"/>
+    <ds:schemaRef ds:uri="http://purl.org/dc/elements/1.1/"/>
+    <ds:schemaRef ds:uri="http://schemas.microsoft.com/office/infopath/2007/PartnerControls"/>
+    <ds:schemaRef ds:uri="71af3243-3dd4-4a8d-8c0d-dd76da1f02a5"/>
+    <ds:schemaRef ds:uri="http://www.w3.org/XML/1998/namespace"/>
+  </ds:schemaRefs>
+</ds:datastoreItem>
+</file>
+
 <file path=customXml/itemProps3.xml><?xml version="1.0" encoding="utf-8"?>
 <ds:datastoreItem xmlns:ds="http://schemas.openxmlformats.org/officeDocument/2006/customXml" ds:itemID="{9AEF1282-A6E9-4912-8AB9-8ED69BF7097D}">
   <ds:schemaRefs>

</xml_diff>

<commit_message>
Apply strategy for calculating each type of bike
Change the source code as Dr.Trang suggested
</commit_message>
<xml_diff>
--- a/Final Submission/Design/Slides - Eco Bike Rental - Group 5.pptx
+++ b/Final Submission/Design/Slides - Eco Bike Rental - Group 5.pptx
@@ -218,7 +218,7 @@
               <a:cs typeface="+mn-cs"/>
             </a:defRPr>
           </a:pPr>
-          <a:endParaRPr lang="vi-VN"/>
+          <a:endParaRPr lang="en-US"/>
         </a:p>
       </c:txPr>
     </c:title>
@@ -350,7 +350,7 @@
                     <a:cs typeface="+mn-cs"/>
                   </a:defRPr>
                 </a:pPr>
-                <a:endParaRPr lang="vi-VN"/>
+                <a:endParaRPr lang="en-US"/>
               </a:p>
             </c:txPr>
             <c:dLblPos val="outEnd"/>
@@ -472,7 +472,7 @@
               <a:cs typeface="+mn-cs"/>
             </a:defRPr>
           </a:pPr>
-          <a:endParaRPr lang="vi-VN"/>
+          <a:endParaRPr lang="en-US"/>
         </a:p>
       </c:txPr>
     </c:legend>
@@ -501,7 +501,7 @@
       <a:pPr>
         <a:defRPr/>
       </a:pPr>
-      <a:endParaRPr lang="vi-VN"/>
+      <a:endParaRPr lang="en-US"/>
     </a:p>
   </c:txPr>
   <c:externalData r:id="rId3">
@@ -575,7 +575,7 @@
               <a:cs typeface="+mn-cs"/>
             </a:defRPr>
           </a:pPr>
-          <a:endParaRPr lang="vi-VN"/>
+          <a:endParaRPr lang="en-US"/>
         </a:p>
       </c:txPr>
     </c:title>
@@ -707,7 +707,7 @@
                     <a:cs typeface="+mn-cs"/>
                   </a:defRPr>
                 </a:pPr>
-                <a:endParaRPr lang="vi-VN"/>
+                <a:endParaRPr lang="en-US"/>
               </a:p>
             </c:txPr>
             <c:dLblPos val="outEnd"/>
@@ -829,7 +829,7 @@
               <a:cs typeface="+mn-cs"/>
             </a:defRPr>
           </a:pPr>
-          <a:endParaRPr lang="vi-VN"/>
+          <a:endParaRPr lang="en-US"/>
         </a:p>
       </c:txPr>
     </c:legend>
@@ -858,7 +858,7 @@
       <a:pPr>
         <a:defRPr/>
       </a:pPr>
-      <a:endParaRPr lang="vi-VN"/>
+      <a:endParaRPr lang="en-US"/>
     </a:p>
   </c:txPr>
   <c:externalData r:id="rId3">
@@ -932,7 +932,7 @@
               <a:cs typeface="+mn-cs"/>
             </a:defRPr>
           </a:pPr>
-          <a:endParaRPr lang="vi-VN"/>
+          <a:endParaRPr lang="en-US"/>
         </a:p>
       </c:txPr>
     </c:title>
@@ -1064,7 +1064,7 @@
                     <a:cs typeface="+mn-cs"/>
                   </a:defRPr>
                 </a:pPr>
-                <a:endParaRPr lang="vi-VN"/>
+                <a:endParaRPr lang="en-US"/>
               </a:p>
             </c:txPr>
             <c:dLblPos val="outEnd"/>
@@ -1186,7 +1186,7 @@
               <a:cs typeface="+mn-cs"/>
             </a:defRPr>
           </a:pPr>
-          <a:endParaRPr lang="vi-VN"/>
+          <a:endParaRPr lang="en-US"/>
         </a:p>
       </c:txPr>
     </c:legend>
@@ -1215,7 +1215,7 @@
       <a:pPr>
         <a:defRPr/>
       </a:pPr>
-      <a:endParaRPr lang="vi-VN"/>
+      <a:endParaRPr lang="en-US"/>
     </a:p>
   </c:txPr>
   <c:externalData r:id="rId3">
@@ -1289,7 +1289,7 @@
               <a:cs typeface="+mn-cs"/>
             </a:defRPr>
           </a:pPr>
-          <a:endParaRPr lang="vi-VN"/>
+          <a:endParaRPr lang="en-US"/>
         </a:p>
       </c:txPr>
     </c:title>
@@ -1421,7 +1421,7 @@
                     <a:cs typeface="+mn-cs"/>
                   </a:defRPr>
                 </a:pPr>
-                <a:endParaRPr lang="vi-VN"/>
+                <a:endParaRPr lang="en-US"/>
               </a:p>
             </c:txPr>
             <c:dLblPos val="outEnd"/>
@@ -1543,7 +1543,7 @@
               <a:cs typeface="+mn-cs"/>
             </a:defRPr>
           </a:pPr>
-          <a:endParaRPr lang="vi-VN"/>
+          <a:endParaRPr lang="en-US"/>
         </a:p>
       </c:txPr>
     </c:legend>
@@ -1572,7 +1572,7 @@
       <a:pPr>
         <a:defRPr/>
       </a:pPr>
-      <a:endParaRPr lang="vi-VN"/>
+      <a:endParaRPr lang="en-US"/>
     </a:p>
   </c:txPr>
   <c:externalData r:id="rId3">
@@ -1646,7 +1646,7 @@
               <a:cs typeface="+mn-cs"/>
             </a:defRPr>
           </a:pPr>
-          <a:endParaRPr lang="vi-VN"/>
+          <a:endParaRPr lang="en-US"/>
         </a:p>
       </c:txPr>
     </c:title>
@@ -1778,7 +1778,7 @@
                     <a:cs typeface="+mn-cs"/>
                   </a:defRPr>
                 </a:pPr>
-                <a:endParaRPr lang="vi-VN"/>
+                <a:endParaRPr lang="en-US"/>
               </a:p>
             </c:txPr>
             <c:dLblPos val="outEnd"/>
@@ -1900,7 +1900,7 @@
               <a:cs typeface="+mn-cs"/>
             </a:defRPr>
           </a:pPr>
-          <a:endParaRPr lang="vi-VN"/>
+          <a:endParaRPr lang="en-US"/>
         </a:p>
       </c:txPr>
     </c:legend>
@@ -1929,7 +1929,7 @@
       <a:pPr>
         <a:defRPr/>
       </a:pPr>
-      <a:endParaRPr lang="vi-VN"/>
+      <a:endParaRPr lang="en-US"/>
     </a:p>
   </c:txPr>
   <c:externalData r:id="rId3">
@@ -2004,7 +2004,7 @@
               <a:cs typeface="+mn-cs"/>
             </a:defRPr>
           </a:pPr>
-          <a:endParaRPr lang="vi-VN"/>
+          <a:endParaRPr lang="en-US"/>
         </a:p>
       </c:txPr>
     </c:title>
@@ -2136,7 +2136,7 @@
                     <a:cs typeface="+mn-cs"/>
                   </a:defRPr>
                 </a:pPr>
-                <a:endParaRPr lang="vi-VN"/>
+                <a:endParaRPr lang="en-US"/>
               </a:p>
             </c:txPr>
             <c:dLblPos val="outEnd"/>
@@ -2258,7 +2258,7 @@
               <a:cs typeface="+mn-cs"/>
             </a:defRPr>
           </a:pPr>
-          <a:endParaRPr lang="vi-VN"/>
+          <a:endParaRPr lang="en-US"/>
         </a:p>
       </c:txPr>
     </c:legend>
@@ -2287,7 +2287,7 @@
       <a:pPr>
         <a:defRPr/>
       </a:pPr>
-      <a:endParaRPr lang="vi-VN"/>
+      <a:endParaRPr lang="en-US"/>
     </a:p>
   </c:txPr>
   <c:externalData r:id="rId3">
@@ -14127,7 +14127,7 @@
           <a:p>
             <a:fld id="{3AD818D7-DF4E-4C59-9BBA-548250DAC33A}" type="datetimeFigureOut">
               <a:rPr lang="en-US" smtClean="0"/>
-              <a:t>12/26/2020</a:t>
+              <a:t>28/12/2020</a:t>
             </a:fld>
             <a:endParaRPr lang="en-US" dirty="0"/>
           </a:p>
@@ -14584,7 +14584,7 @@
           <a:p>
             <a:fld id="{3E149229-E3F7-4B08-B8B0-567DB9AE2DBD}" type="datetime1">
               <a:rPr lang="en-US" smtClean="0"/>
-              <a:t>12/26/2020</a:t>
+              <a:t>28/12/2020</a:t>
             </a:fld>
             <a:endParaRPr lang="en-US" dirty="0"/>
           </a:p>
@@ -14790,7 +14790,7 @@
           <a:p>
             <a:fld id="{1AA39CD9-90D5-49BD-B792-F7F07D136C39}" type="datetime1">
               <a:rPr lang="en-US" smtClean="0"/>
-              <a:t>12/26/2020</a:t>
+              <a:t>28/12/2020</a:t>
             </a:fld>
             <a:endParaRPr lang="en-US" dirty="0"/>
           </a:p>
@@ -14972,7 +14972,7 @@
           <a:p>
             <a:fld id="{1AA39CD9-90D5-49BD-B792-F7F07D136C39}" type="datetime1">
               <a:rPr lang="en-US" smtClean="0"/>
-              <a:t>12/26/2020</a:t>
+              <a:t>28/12/2020</a:t>
             </a:fld>
             <a:endParaRPr lang="en-US" dirty="0"/>
           </a:p>
@@ -15179,7 +15179,7 @@
           <a:p>
             <a:fld id="{1AA39CD9-90D5-49BD-B792-F7F07D136C39}" type="datetime1">
               <a:rPr lang="en-US" smtClean="0"/>
-              <a:t>12/26/2020</a:t>
+              <a:t>28/12/2020</a:t>
             </a:fld>
             <a:endParaRPr lang="en-US" dirty="0"/>
           </a:p>
@@ -15476,7 +15476,7 @@
           <a:p>
             <a:fld id="{0E2464DF-92FB-4D4C-B2DE-15BC5F46772E}" type="datetime1">
               <a:rPr lang="en-US" smtClean="0"/>
-              <a:t>12/26/2020</a:t>
+              <a:t>28/12/2020</a:t>
             </a:fld>
             <a:endParaRPr lang="en-US" dirty="0"/>
           </a:p>
@@ -15749,7 +15749,7 @@
           <a:p>
             <a:fld id="{1AA39CD9-90D5-49BD-B792-F7F07D136C39}" type="datetime1">
               <a:rPr lang="en-US" smtClean="0"/>
-              <a:t>12/26/2020</a:t>
+              <a:t>28/12/2020</a:t>
             </a:fld>
             <a:endParaRPr lang="en-US" dirty="0"/>
           </a:p>
@@ -16158,7 +16158,7 @@
           <a:p>
             <a:fld id="{1AA39CD9-90D5-49BD-B792-F7F07D136C39}" type="datetime1">
               <a:rPr lang="en-US" smtClean="0"/>
-              <a:t>12/26/2020</a:t>
+              <a:t>28/12/2020</a:t>
             </a:fld>
             <a:endParaRPr lang="en-US" dirty="0"/>
           </a:p>
@@ -16278,7 +16278,7 @@
           <a:p>
             <a:fld id="{B60B054C-5E05-4896-867A-8DB56A20C8AC}" type="datetime1">
               <a:rPr lang="en-US" smtClean="0"/>
-              <a:t>12/26/2020</a:t>
+              <a:t>28/12/2020</a:t>
             </a:fld>
             <a:endParaRPr lang="en-US" dirty="0"/>
           </a:p>
@@ -16374,7 +16374,7 @@
           <a:p>
             <a:fld id="{A694B787-46DA-4B4F-B781-E768630FCF2A}" type="datetime1">
               <a:rPr lang="en-US" smtClean="0"/>
-              <a:t>12/26/2020</a:t>
+              <a:t>28/12/2020</a:t>
             </a:fld>
             <a:endParaRPr lang="en-US" dirty="0"/>
           </a:p>
@@ -16665,7 +16665,7 @@
           <a:p>
             <a:fld id="{1AA39CD9-90D5-49BD-B792-F7F07D136C39}" type="datetime1">
               <a:rPr lang="en-US" smtClean="0"/>
-              <a:t>12/26/2020</a:t>
+              <a:t>28/12/2020</a:t>
             </a:fld>
             <a:endParaRPr lang="en-US" dirty="0"/>
           </a:p>
@@ -16947,7 +16947,7 @@
           <a:p>
             <a:fld id="{1AA39CD9-90D5-49BD-B792-F7F07D136C39}" type="datetime1">
               <a:rPr lang="en-US" smtClean="0"/>
-              <a:t>12/26/2020</a:t>
+              <a:t>28/12/2020</a:t>
             </a:fld>
             <a:endParaRPr lang="en-US" dirty="0"/>
           </a:p>
@@ -17199,7 +17199,7 @@
           <a:p>
             <a:fld id="{1AA39CD9-90D5-49BD-B792-F7F07D136C39}" type="datetime1">
               <a:rPr lang="en-US" smtClean="0"/>
-              <a:t>12/26/2020</a:t>
+              <a:t>28/12/2020</a:t>
             </a:fld>
             <a:endParaRPr lang="en-US" dirty="0"/>
           </a:p>
@@ -19441,7 +19441,7 @@
         </p:nvSpPr>
         <p:spPr>
           <a:xfrm>
-            <a:off x="675745" y="1600959"/>
+            <a:off x="713845" y="1796701"/>
             <a:ext cx="4185623" cy="576262"/>
           </a:xfrm>
         </p:spPr>
@@ -19475,7 +19475,7 @@
         </p:nvSpPr>
         <p:spPr>
           <a:xfrm>
-            <a:off x="675745" y="2370016"/>
+            <a:off x="713845" y="2565758"/>
             <a:ext cx="4185623" cy="3493456"/>
           </a:xfrm>
         </p:spPr>
@@ -19549,8 +19549,8 @@
         </p:blipFill>
         <p:spPr>
           <a:xfrm>
-            <a:off x="5764696" y="1600959"/>
-            <a:ext cx="5108713" cy="5045512"/>
+            <a:off x="5829300" y="1664764"/>
+            <a:ext cx="5044109" cy="4981707"/>
           </a:xfrm>
           <a:prstGeom prst="rect">
             <a:avLst/>
@@ -20125,7 +20125,7 @@
                             </p:stCondLst>
                             <p:childTnLst>
                               <p:par>
-                                <p:cTn id="5" presetID="2" presetClass="entr" presetSubtype="4" fill="hold" grpId="0" nodeType="clickEffect">
+                                <p:cTn id="5" presetID="2" presetClass="entr" presetSubtype="8" fill="hold" grpId="0" nodeType="clickEffect">
                                   <p:stCondLst>
                                     <p:cond delay="0"/>
                                   </p:stCondLst>
@@ -20169,7 +20169,7 @@
                                       <p:tavLst>
                                         <p:tav tm="0">
                                           <p:val>
-                                            <p:strVal val="#ppt_x"/>
+                                            <p:strVal val="0-#ppt_w/2"/>
                                           </p:val>
                                         </p:tav>
                                         <p:tav tm="100000">
@@ -20196,7 +20196,7 @@
                                       <p:tavLst>
                                         <p:tav tm="0">
                                           <p:val>
-                                            <p:strVal val="1+#ppt_h/2"/>
+                                            <p:strVal val="#ppt_y"/>
                                           </p:val>
                                         </p:tav>
                                         <p:tav tm="100000">
@@ -20210,7 +20210,7 @@
                                 </p:cTn>
                               </p:par>
                               <p:par>
-                                <p:cTn id="9" presetID="2" presetClass="entr" presetSubtype="4" fill="hold" grpId="0" nodeType="withEffect">
+                                <p:cTn id="9" presetID="2" presetClass="entr" presetSubtype="8" fill="hold" grpId="0" nodeType="withEffect">
                                   <p:stCondLst>
                                     <p:cond delay="0"/>
                                   </p:stCondLst>
@@ -20254,7 +20254,7 @@
                                       <p:tavLst>
                                         <p:tav tm="0">
                                           <p:val>
-                                            <p:strVal val="#ppt_x"/>
+                                            <p:strVal val="0-#ppt_w/2"/>
                                           </p:val>
                                         </p:tav>
                                         <p:tav tm="100000">
@@ -20281,7 +20281,7 @@
                                       <p:tavLst>
                                         <p:tav tm="0">
                                           <p:val>
-                                            <p:strVal val="1+#ppt_h/2"/>
+                                            <p:strVal val="#ppt_y"/>
                                           </p:val>
                                         </p:tav>
                                         <p:tav tm="100000">
@@ -20295,7 +20295,7 @@
                                 </p:cTn>
                               </p:par>
                               <p:par>
-                                <p:cTn id="13" presetID="2" presetClass="entr" presetSubtype="4" fill="hold" grpId="0" nodeType="withEffect">
+                                <p:cTn id="13" presetID="2" presetClass="entr" presetSubtype="8" fill="hold" grpId="0" nodeType="withEffect">
                                   <p:stCondLst>
                                     <p:cond delay="0"/>
                                   </p:stCondLst>
@@ -20339,7 +20339,7 @@
                                       <p:tavLst>
                                         <p:tav tm="0">
                                           <p:val>
-                                            <p:strVal val="#ppt_x"/>
+                                            <p:strVal val="0-#ppt_w/2"/>
                                           </p:val>
                                         </p:tav>
                                         <p:tav tm="100000">
@@ -20366,7 +20366,7 @@
                                       <p:tavLst>
                                         <p:tav tm="0">
                                           <p:val>
-                                            <p:strVal val="1+#ppt_h/2"/>
+                                            <p:strVal val="#ppt_y"/>
                                           </p:val>
                                         </p:tav>
                                         <p:tav tm="100000">
@@ -20380,7 +20380,7 @@
                                 </p:cTn>
                               </p:par>
                               <p:par>
-                                <p:cTn id="17" presetID="2" presetClass="entr" presetSubtype="4" fill="hold" grpId="0" nodeType="withEffect">
+                                <p:cTn id="17" presetID="2" presetClass="entr" presetSubtype="8" fill="hold" grpId="0" nodeType="withEffect">
                                   <p:stCondLst>
                                     <p:cond delay="0"/>
                                   </p:stCondLst>
@@ -20424,7 +20424,7 @@
                                       <p:tavLst>
                                         <p:tav tm="0">
                                           <p:val>
-                                            <p:strVal val="#ppt_x"/>
+                                            <p:strVal val="0-#ppt_w/2"/>
                                           </p:val>
                                         </p:tav>
                                         <p:tav tm="100000">
@@ -20451,7 +20451,7 @@
                                       <p:tavLst>
                                         <p:tav tm="0">
                                           <p:val>
-                                            <p:strVal val="1+#ppt_h/2"/>
+                                            <p:strVal val="#ppt_y"/>
                                           </p:val>
                                         </p:tav>
                                         <p:tav tm="100000">
@@ -20465,7 +20465,7 @@
                                 </p:cTn>
                               </p:par>
                               <p:par>
-                                <p:cTn id="21" presetID="2" presetClass="entr" presetSubtype="4" fill="hold" grpId="0" nodeType="withEffect">
+                                <p:cTn id="21" presetID="2" presetClass="entr" presetSubtype="8" fill="hold" grpId="0" nodeType="withEffect">
                                   <p:stCondLst>
                                     <p:cond delay="0"/>
                                   </p:stCondLst>
@@ -20509,7 +20509,7 @@
                                       <p:tavLst>
                                         <p:tav tm="0">
                                           <p:val>
-                                            <p:strVal val="#ppt_x"/>
+                                            <p:strVal val="0-#ppt_w/2"/>
                                           </p:val>
                                         </p:tav>
                                         <p:tav tm="100000">
@@ -20536,7 +20536,7 @@
                                       <p:tavLst>
                                         <p:tav tm="0">
                                           <p:val>
-                                            <p:strVal val="1+#ppt_h/2"/>
+                                            <p:strVal val="#ppt_y"/>
                                           </p:val>
                                         </p:tav>
                                         <p:tav tm="100000">
@@ -20550,7 +20550,7 @@
                                 </p:cTn>
                               </p:par>
                               <p:par>
-                                <p:cTn id="25" presetID="2" presetClass="entr" presetSubtype="4" fill="hold" grpId="0" nodeType="withEffect">
+                                <p:cTn id="25" presetID="2" presetClass="entr" presetSubtype="8" fill="hold" grpId="0" nodeType="withEffect">
                                   <p:stCondLst>
                                     <p:cond delay="0"/>
                                   </p:stCondLst>
@@ -20594,7 +20594,7 @@
                                       <p:tavLst>
                                         <p:tav tm="0">
                                           <p:val>
-                                            <p:strVal val="#ppt_x"/>
+                                            <p:strVal val="0-#ppt_w/2"/>
                                           </p:val>
                                         </p:tav>
                                         <p:tav tm="100000">
@@ -20621,7 +20621,7 @@
                                       <p:tavLst>
                                         <p:tav tm="0">
                                           <p:val>
-                                            <p:strVal val="1+#ppt_h/2"/>
+                                            <p:strVal val="#ppt_y"/>
                                           </p:val>
                                         </p:tav>
                                         <p:tav tm="100000">
@@ -20635,7 +20635,7 @@
                                 </p:cTn>
                               </p:par>
                               <p:par>
-                                <p:cTn id="29" presetID="2" presetClass="entr" presetSubtype="4" fill="hold" grpId="0" nodeType="withEffect">
+                                <p:cTn id="29" presetID="2" presetClass="entr" presetSubtype="8" fill="hold" grpId="0" nodeType="withEffect">
                                   <p:stCondLst>
                                     <p:cond delay="0"/>
                                   </p:stCondLst>
@@ -20679,7 +20679,7 @@
                                       <p:tavLst>
                                         <p:tav tm="0">
                                           <p:val>
-                                            <p:strVal val="#ppt_x"/>
+                                            <p:strVal val="0-#ppt_w/2"/>
                                           </p:val>
                                         </p:tav>
                                         <p:tav tm="100000">
@@ -20706,7 +20706,7 @@
                                       <p:tavLst>
                                         <p:tav tm="0">
                                           <p:val>
-                                            <p:strVal val="1+#ppt_h/2"/>
+                                            <p:strVal val="#ppt_y"/>
                                           </p:val>
                                         </p:tav>
                                         <p:tav tm="100000">
@@ -20720,7 +20720,7 @@
                                 </p:cTn>
                               </p:par>
                               <p:par>
-                                <p:cTn id="33" presetID="2" presetClass="entr" presetSubtype="4" fill="hold" grpId="0" nodeType="withEffect">
+                                <p:cTn id="33" presetID="2" presetClass="entr" presetSubtype="8" fill="hold" grpId="0" nodeType="withEffect">
                                   <p:stCondLst>
                                     <p:cond delay="0"/>
                                   </p:stCondLst>
@@ -20764,7 +20764,7 @@
                                       <p:tavLst>
                                         <p:tav tm="0">
                                           <p:val>
-                                            <p:strVal val="#ppt_x"/>
+                                            <p:strVal val="0-#ppt_w/2"/>
                                           </p:val>
                                         </p:tav>
                                         <p:tav tm="100000">
@@ -20791,7 +20791,7 @@
                                       <p:tavLst>
                                         <p:tav tm="0">
                                           <p:val>
-                                            <p:strVal val="1+#ppt_h/2"/>
+                                            <p:strVal val="#ppt_y"/>
                                           </p:val>
                                         </p:tav>
                                         <p:tav tm="100000">
@@ -20823,7 +20823,7 @@
                             </p:stCondLst>
                             <p:childTnLst>
                               <p:par>
-                                <p:cTn id="39" presetID="2" presetClass="entr" presetSubtype="4" fill="hold" grpId="0" nodeType="clickEffect">
+                                <p:cTn id="39" presetID="2" presetClass="entr" presetSubtype="8" fill="hold" grpId="0" nodeType="clickEffect">
                                   <p:stCondLst>
                                     <p:cond delay="0"/>
                                   </p:stCondLst>
@@ -20867,7 +20867,7 @@
                                       <p:tavLst>
                                         <p:tav tm="0">
                                           <p:val>
-                                            <p:strVal val="#ppt_x"/>
+                                            <p:strVal val="0-#ppt_w/2"/>
                                           </p:val>
                                         </p:tav>
                                         <p:tav tm="100000">
@@ -20894,7 +20894,7 @@
                                       <p:tavLst>
                                         <p:tav tm="0">
                                           <p:val>
-                                            <p:strVal val="1+#ppt_h/2"/>
+                                            <p:strVal val="#ppt_y"/>
                                           </p:val>
                                         </p:tav>
                                         <p:tav tm="100000">
@@ -20908,7 +20908,7 @@
                                 </p:cTn>
                               </p:par>
                               <p:par>
-                                <p:cTn id="43" presetID="2" presetClass="entr" presetSubtype="4" fill="hold" grpId="0" nodeType="withEffect">
+                                <p:cTn id="43" presetID="2" presetClass="entr" presetSubtype="8" fill="hold" grpId="0" nodeType="withEffect">
                                   <p:stCondLst>
                                     <p:cond delay="0"/>
                                   </p:stCondLst>
@@ -20952,7 +20952,7 @@
                                       <p:tavLst>
                                         <p:tav tm="0">
                                           <p:val>
-                                            <p:strVal val="#ppt_x"/>
+                                            <p:strVal val="0-#ppt_w/2"/>
                                           </p:val>
                                         </p:tav>
                                         <p:tav tm="100000">
@@ -20979,7 +20979,7 @@
                                       <p:tavLst>
                                         <p:tav tm="0">
                                           <p:val>
-                                            <p:strVal val="1+#ppt_h/2"/>
+                                            <p:strVal val="#ppt_y"/>
                                           </p:val>
                                         </p:tav>
                                         <p:tav tm="100000">
@@ -20993,7 +20993,7 @@
                                 </p:cTn>
                               </p:par>
                               <p:par>
-                                <p:cTn id="47" presetID="2" presetClass="entr" presetSubtype="4" fill="hold" grpId="0" nodeType="withEffect">
+                                <p:cTn id="47" presetID="2" presetClass="entr" presetSubtype="8" fill="hold" grpId="0" nodeType="withEffect">
                                   <p:stCondLst>
                                     <p:cond delay="0"/>
                                   </p:stCondLst>
@@ -21037,7 +21037,7 @@
                                       <p:tavLst>
                                         <p:tav tm="0">
                                           <p:val>
-                                            <p:strVal val="#ppt_x"/>
+                                            <p:strVal val="0-#ppt_w/2"/>
                                           </p:val>
                                         </p:tav>
                                         <p:tav tm="100000">
@@ -21064,7 +21064,7 @@
                                       <p:tavLst>
                                         <p:tav tm="0">
                                           <p:val>
-                                            <p:strVal val="1+#ppt_h/2"/>
+                                            <p:strVal val="#ppt_y"/>
                                           </p:val>
                                         </p:tav>
                                         <p:tav tm="100000">
@@ -21078,7 +21078,7 @@
                                 </p:cTn>
                               </p:par>
                               <p:par>
-                                <p:cTn id="51" presetID="2" presetClass="entr" presetSubtype="4" fill="hold" grpId="0" nodeType="withEffect">
+                                <p:cTn id="51" presetID="2" presetClass="entr" presetSubtype="8" fill="hold" grpId="0" nodeType="withEffect">
                                   <p:stCondLst>
                                     <p:cond delay="0"/>
                                   </p:stCondLst>
@@ -21122,7 +21122,7 @@
                                       <p:tavLst>
                                         <p:tav tm="0">
                                           <p:val>
-                                            <p:strVal val="#ppt_x"/>
+                                            <p:strVal val="0-#ppt_w/2"/>
                                           </p:val>
                                         </p:tav>
                                         <p:tav tm="100000">
@@ -21149,7 +21149,7 @@
                                       <p:tavLst>
                                         <p:tav tm="0">
                                           <p:val>
-                                            <p:strVal val="1+#ppt_h/2"/>
+                                            <p:strVal val="#ppt_y"/>
                                           </p:val>
                                         </p:tav>
                                         <p:tav tm="100000">
@@ -21163,7 +21163,7 @@
                                 </p:cTn>
                               </p:par>
                               <p:par>
-                                <p:cTn id="55" presetID="2" presetClass="entr" presetSubtype="4" fill="hold" grpId="0" nodeType="withEffect">
+                                <p:cTn id="55" presetID="2" presetClass="entr" presetSubtype="8" fill="hold" grpId="0" nodeType="withEffect">
                                   <p:stCondLst>
                                     <p:cond delay="0"/>
                                   </p:stCondLst>
@@ -21207,7 +21207,7 @@
                                       <p:tavLst>
                                         <p:tav tm="0">
                                           <p:val>
-                                            <p:strVal val="#ppt_x"/>
+                                            <p:strVal val="0-#ppt_w/2"/>
                                           </p:val>
                                         </p:tav>
                                         <p:tav tm="100000">
@@ -21234,7 +21234,7 @@
                                       <p:tavLst>
                                         <p:tav tm="0">
                                           <p:val>
-                                            <p:strVal val="1+#ppt_h/2"/>
+                                            <p:strVal val="#ppt_y"/>
                                           </p:val>
                                         </p:tav>
                                         <p:tav tm="100000">
@@ -21248,7 +21248,7 @@
                                 </p:cTn>
                               </p:par>
                               <p:par>
-                                <p:cTn id="59" presetID="2" presetClass="entr" presetSubtype="4" fill="hold" grpId="0" nodeType="withEffect">
+                                <p:cTn id="59" presetID="2" presetClass="entr" presetSubtype="8" fill="hold" grpId="0" nodeType="withEffect">
                                   <p:stCondLst>
                                     <p:cond delay="0"/>
                                   </p:stCondLst>
@@ -21292,7 +21292,7 @@
                                       <p:tavLst>
                                         <p:tav tm="0">
                                           <p:val>
-                                            <p:strVal val="#ppt_x"/>
+                                            <p:strVal val="0-#ppt_w/2"/>
                                           </p:val>
                                         </p:tav>
                                         <p:tav tm="100000">
@@ -21319,7 +21319,7 @@
                                       <p:tavLst>
                                         <p:tav tm="0">
                                           <p:val>
-                                            <p:strVal val="1+#ppt_h/2"/>
+                                            <p:strVal val="#ppt_y"/>
                                           </p:val>
                                         </p:tav>
                                         <p:tav tm="100000">
@@ -21333,7 +21333,7 @@
                                 </p:cTn>
                               </p:par>
                               <p:par>
-                                <p:cTn id="63" presetID="2" presetClass="entr" presetSubtype="4" fill="hold" grpId="0" nodeType="withEffect">
+                                <p:cTn id="63" presetID="2" presetClass="entr" presetSubtype="8" fill="hold" grpId="0" nodeType="withEffect">
                                   <p:stCondLst>
                                     <p:cond delay="0"/>
                                   </p:stCondLst>
@@ -21377,7 +21377,7 @@
                                       <p:tavLst>
                                         <p:tav tm="0">
                                           <p:val>
-                                            <p:strVal val="#ppt_x"/>
+                                            <p:strVal val="0-#ppt_w/2"/>
                                           </p:val>
                                         </p:tav>
                                         <p:tav tm="100000">
@@ -21404,7 +21404,7 @@
                                       <p:tavLst>
                                         <p:tav tm="0">
                                           <p:val>
-                                            <p:strVal val="1+#ppt_h/2"/>
+                                            <p:strVal val="#ppt_y"/>
                                           </p:val>
                                         </p:tav>
                                         <p:tav tm="100000">
@@ -21418,7 +21418,7 @@
                                 </p:cTn>
                               </p:par>
                               <p:par>
-                                <p:cTn id="67" presetID="2" presetClass="entr" presetSubtype="4" fill="hold" grpId="0" nodeType="withEffect">
+                                <p:cTn id="67" presetID="2" presetClass="entr" presetSubtype="8" fill="hold" grpId="0" nodeType="withEffect">
                                   <p:stCondLst>
                                     <p:cond delay="0"/>
                                   </p:stCondLst>
@@ -21462,7 +21462,7 @@
                                       <p:tavLst>
                                         <p:tav tm="0">
                                           <p:val>
-                                            <p:strVal val="#ppt_x"/>
+                                            <p:strVal val="0-#ppt_w/2"/>
                                           </p:val>
                                         </p:tav>
                                         <p:tav tm="100000">
@@ -21489,7 +21489,7 @@
                                       <p:tavLst>
                                         <p:tav tm="0">
                                           <p:val>
-                                            <p:strVal val="1+#ppt_h/2"/>
+                                            <p:strVal val="#ppt_y"/>
                                           </p:val>
                                         </p:tav>
                                         <p:tav tm="100000">
@@ -21521,7 +21521,7 @@
                             </p:stCondLst>
                             <p:childTnLst>
                               <p:par>
-                                <p:cTn id="73" presetID="2" presetClass="entr" presetSubtype="4" fill="hold" grpId="0" nodeType="clickEffect">
+                                <p:cTn id="73" presetID="2" presetClass="entr" presetSubtype="8" fill="hold" grpId="0" nodeType="clickEffect">
                                   <p:stCondLst>
                                     <p:cond delay="0"/>
                                   </p:stCondLst>
@@ -21565,7 +21565,7 @@
                                       <p:tavLst>
                                         <p:tav tm="0">
                                           <p:val>
-                                            <p:strVal val="#ppt_x"/>
+                                            <p:strVal val="0-#ppt_w/2"/>
                                           </p:val>
                                         </p:tav>
                                         <p:tav tm="100000">
@@ -21592,7 +21592,7 @@
                                       <p:tavLst>
                                         <p:tav tm="0">
                                           <p:val>
-                                            <p:strVal val="1+#ppt_h/2"/>
+                                            <p:strVal val="#ppt_y"/>
                                           </p:val>
                                         </p:tav>
                                         <p:tav tm="100000">
@@ -21606,7 +21606,7 @@
                                 </p:cTn>
                               </p:par>
                               <p:par>
-                                <p:cTn id="77" presetID="2" presetClass="entr" presetSubtype="4" fill="hold" grpId="0" nodeType="withEffect">
+                                <p:cTn id="77" presetID="2" presetClass="entr" presetSubtype="8" fill="hold" grpId="0" nodeType="withEffect">
                                   <p:stCondLst>
                                     <p:cond delay="0"/>
                                   </p:stCondLst>
@@ -21650,7 +21650,7 @@
                                       <p:tavLst>
                                         <p:tav tm="0">
                                           <p:val>
-                                            <p:strVal val="#ppt_x"/>
+                                            <p:strVal val="0-#ppt_w/2"/>
                                           </p:val>
                                         </p:tav>
                                         <p:tav tm="100000">
@@ -21677,7 +21677,7 @@
                                       <p:tavLst>
                                         <p:tav tm="0">
                                           <p:val>
-                                            <p:strVal val="1+#ppt_h/2"/>
+                                            <p:strVal val="#ppt_y"/>
                                           </p:val>
                                         </p:tav>
                                         <p:tav tm="100000">
@@ -21691,7 +21691,7 @@
                                 </p:cTn>
                               </p:par>
                               <p:par>
-                                <p:cTn id="81" presetID="2" presetClass="entr" presetSubtype="4" fill="hold" grpId="0" nodeType="withEffect">
+                                <p:cTn id="81" presetID="2" presetClass="entr" presetSubtype="8" fill="hold" grpId="0" nodeType="withEffect">
                                   <p:stCondLst>
                                     <p:cond delay="0"/>
                                   </p:stCondLst>
@@ -21735,7 +21735,7 @@
                                       <p:tavLst>
                                         <p:tav tm="0">
                                           <p:val>
-                                            <p:strVal val="#ppt_x"/>
+                                            <p:strVal val="0-#ppt_w/2"/>
                                           </p:val>
                                         </p:tav>
                                         <p:tav tm="100000">
@@ -21762,7 +21762,7 @@
                                       <p:tavLst>
                                         <p:tav tm="0">
                                           <p:val>
-                                            <p:strVal val="1+#ppt_h/2"/>
+                                            <p:strVal val="#ppt_y"/>
                                           </p:val>
                                         </p:tav>
                                         <p:tav tm="100000">
@@ -21776,7 +21776,7 @@
                                 </p:cTn>
                               </p:par>
                               <p:par>
-                                <p:cTn id="85" presetID="2" presetClass="entr" presetSubtype="4" fill="hold" grpId="0" nodeType="withEffect">
+                                <p:cTn id="85" presetID="2" presetClass="entr" presetSubtype="8" fill="hold" grpId="0" nodeType="withEffect">
                                   <p:stCondLst>
                                     <p:cond delay="0"/>
                                   </p:stCondLst>
@@ -21820,7 +21820,7 @@
                                       <p:tavLst>
                                         <p:tav tm="0">
                                           <p:val>
-                                            <p:strVal val="#ppt_x"/>
+                                            <p:strVal val="0-#ppt_w/2"/>
                                           </p:val>
                                         </p:tav>
                                         <p:tav tm="100000">
@@ -21847,7 +21847,7 @@
                                       <p:tavLst>
                                         <p:tav tm="0">
                                           <p:val>
-                                            <p:strVal val="1+#ppt_h/2"/>
+                                            <p:strVal val="#ppt_y"/>
                                           </p:val>
                                         </p:tav>
                                         <p:tav tm="100000">
@@ -21861,7 +21861,7 @@
                                 </p:cTn>
                               </p:par>
                               <p:par>
-                                <p:cTn id="89" presetID="2" presetClass="entr" presetSubtype="4" fill="hold" grpId="0" nodeType="withEffect">
+                                <p:cTn id="89" presetID="2" presetClass="entr" presetSubtype="8" fill="hold" grpId="0" nodeType="withEffect">
                                   <p:stCondLst>
                                     <p:cond delay="0"/>
                                   </p:stCondLst>
@@ -21905,7 +21905,7 @@
                                       <p:tavLst>
                                         <p:tav tm="0">
                                           <p:val>
-                                            <p:strVal val="#ppt_x"/>
+                                            <p:strVal val="0-#ppt_w/2"/>
                                           </p:val>
                                         </p:tav>
                                         <p:tav tm="100000">
@@ -21932,7 +21932,7 @@
                                       <p:tavLst>
                                         <p:tav tm="0">
                                           <p:val>
-                                            <p:strVal val="1+#ppt_h/2"/>
+                                            <p:strVal val="#ppt_y"/>
                                           </p:val>
                                         </p:tav>
                                         <p:tav tm="100000">
@@ -21946,7 +21946,7 @@
                                 </p:cTn>
                               </p:par>
                               <p:par>
-                                <p:cTn id="93" presetID="2" presetClass="entr" presetSubtype="4" fill="hold" grpId="0" nodeType="withEffect">
+                                <p:cTn id="93" presetID="2" presetClass="entr" presetSubtype="8" fill="hold" grpId="0" nodeType="withEffect">
                                   <p:stCondLst>
                                     <p:cond delay="0"/>
                                   </p:stCondLst>
@@ -21990,7 +21990,7 @@
                                       <p:tavLst>
                                         <p:tav tm="0">
                                           <p:val>
-                                            <p:strVal val="#ppt_x"/>
+                                            <p:strVal val="0-#ppt_w/2"/>
                                           </p:val>
                                         </p:tav>
                                         <p:tav tm="100000">
@@ -22017,7 +22017,7 @@
                                       <p:tavLst>
                                         <p:tav tm="0">
                                           <p:val>
-                                            <p:strVal val="1+#ppt_h/2"/>
+                                            <p:strVal val="#ppt_y"/>
                                           </p:val>
                                         </p:tav>
                                         <p:tav tm="100000">
@@ -22031,7 +22031,7 @@
                                 </p:cTn>
                               </p:par>
                               <p:par>
-                                <p:cTn id="97" presetID="2" presetClass="entr" presetSubtype="4" fill="hold" grpId="0" nodeType="withEffect">
+                                <p:cTn id="97" presetID="2" presetClass="entr" presetSubtype="8" fill="hold" grpId="0" nodeType="withEffect">
                                   <p:stCondLst>
                                     <p:cond delay="0"/>
                                   </p:stCondLst>
@@ -22075,7 +22075,7 @@
                                       <p:tavLst>
                                         <p:tav tm="0">
                                           <p:val>
-                                            <p:strVal val="#ppt_x"/>
+                                            <p:strVal val="0-#ppt_w/2"/>
                                           </p:val>
                                         </p:tav>
                                         <p:tav tm="100000">
@@ -22102,7 +22102,7 @@
                                       <p:tavLst>
                                         <p:tav tm="0">
                                           <p:val>
-                                            <p:strVal val="1+#ppt_h/2"/>
+                                            <p:strVal val="#ppt_y"/>
                                           </p:val>
                                         </p:tav>
                                         <p:tav tm="100000">
@@ -22116,7 +22116,7 @@
                                 </p:cTn>
                               </p:par>
                               <p:par>
-                                <p:cTn id="101" presetID="2" presetClass="entr" presetSubtype="4" fill="hold" grpId="0" nodeType="withEffect">
+                                <p:cTn id="101" presetID="2" presetClass="entr" presetSubtype="8" fill="hold" grpId="0" nodeType="withEffect">
                                   <p:stCondLst>
                                     <p:cond delay="0"/>
                                   </p:stCondLst>
@@ -22160,7 +22160,7 @@
                                       <p:tavLst>
                                         <p:tav tm="0">
                                           <p:val>
-                                            <p:strVal val="#ppt_x"/>
+                                            <p:strVal val="0-#ppt_w/2"/>
                                           </p:val>
                                         </p:tav>
                                         <p:tav tm="100000">
@@ -22187,7 +22187,7 @@
                                       <p:tavLst>
                                         <p:tav tm="0">
                                           <p:val>
-                                            <p:strVal val="1+#ppt_h/2"/>
+                                            <p:strVal val="#ppt_y"/>
                                           </p:val>
                                         </p:tav>
                                         <p:tav tm="100000">
@@ -22219,7 +22219,7 @@
                             </p:stCondLst>
                             <p:childTnLst>
                               <p:par>
-                                <p:cTn id="107" presetID="2" presetClass="entr" presetSubtype="4" fill="hold" grpId="0" nodeType="clickEffect">
+                                <p:cTn id="107" presetID="2" presetClass="entr" presetSubtype="8" fill="hold" grpId="0" nodeType="clickEffect">
                                   <p:stCondLst>
                                     <p:cond delay="0"/>
                                   </p:stCondLst>
@@ -22263,7 +22263,7 @@
                                       <p:tavLst>
                                         <p:tav tm="0">
                                           <p:val>
-                                            <p:strVal val="#ppt_x"/>
+                                            <p:strVal val="0-#ppt_w/2"/>
                                           </p:val>
                                         </p:tav>
                                         <p:tav tm="100000">
@@ -22290,7 +22290,7 @@
                                       <p:tavLst>
                                         <p:tav tm="0">
                                           <p:val>
-                                            <p:strVal val="1+#ppt_h/2"/>
+                                            <p:strVal val="#ppt_y"/>
                                           </p:val>
                                         </p:tav>
                                         <p:tav tm="100000">
@@ -22304,7 +22304,7 @@
                                 </p:cTn>
                               </p:par>
                               <p:par>
-                                <p:cTn id="111" presetID="2" presetClass="entr" presetSubtype="4" fill="hold" grpId="0" nodeType="withEffect">
+                                <p:cTn id="111" presetID="2" presetClass="entr" presetSubtype="8" fill="hold" grpId="0" nodeType="withEffect">
                                   <p:stCondLst>
                                     <p:cond delay="0"/>
                                   </p:stCondLst>
@@ -22348,7 +22348,7 @@
                                       <p:tavLst>
                                         <p:tav tm="0">
                                           <p:val>
-                                            <p:strVal val="#ppt_x"/>
+                                            <p:strVal val="0-#ppt_w/2"/>
                                           </p:val>
                                         </p:tav>
                                         <p:tav tm="100000">
@@ -22375,7 +22375,7 @@
                                       <p:tavLst>
                                         <p:tav tm="0">
                                           <p:val>
-                                            <p:strVal val="1+#ppt_h/2"/>
+                                            <p:strVal val="#ppt_y"/>
                                           </p:val>
                                         </p:tav>
                                         <p:tav tm="100000">
@@ -22389,7 +22389,7 @@
                                 </p:cTn>
                               </p:par>
                               <p:par>
-                                <p:cTn id="115" presetID="2" presetClass="entr" presetSubtype="4" fill="hold" grpId="0" nodeType="withEffect">
+                                <p:cTn id="115" presetID="2" presetClass="entr" presetSubtype="8" fill="hold" grpId="0" nodeType="withEffect">
                                   <p:stCondLst>
                                     <p:cond delay="0"/>
                                   </p:stCondLst>
@@ -22433,7 +22433,7 @@
                                       <p:tavLst>
                                         <p:tav tm="0">
                                           <p:val>
-                                            <p:strVal val="#ppt_x"/>
+                                            <p:strVal val="0-#ppt_w/2"/>
                                           </p:val>
                                         </p:tav>
                                         <p:tav tm="100000">
@@ -22460,7 +22460,7 @@
                                       <p:tavLst>
                                         <p:tav tm="0">
                                           <p:val>
-                                            <p:strVal val="1+#ppt_h/2"/>
+                                            <p:strVal val="#ppt_y"/>
                                           </p:val>
                                         </p:tav>
                                         <p:tav tm="100000">
@@ -22474,7 +22474,7 @@
                                 </p:cTn>
                               </p:par>
                               <p:par>
-                                <p:cTn id="119" presetID="2" presetClass="entr" presetSubtype="4" fill="hold" grpId="0" nodeType="withEffect">
+                                <p:cTn id="119" presetID="2" presetClass="entr" presetSubtype="8" fill="hold" grpId="0" nodeType="withEffect">
                                   <p:stCondLst>
                                     <p:cond delay="0"/>
                                   </p:stCondLst>
@@ -22518,7 +22518,7 @@
                                       <p:tavLst>
                                         <p:tav tm="0">
                                           <p:val>
-                                            <p:strVal val="#ppt_x"/>
+                                            <p:strVal val="0-#ppt_w/2"/>
                                           </p:val>
                                         </p:tav>
                                         <p:tav tm="100000">
@@ -22545,7 +22545,7 @@
                                       <p:tavLst>
                                         <p:tav tm="0">
                                           <p:val>
-                                            <p:strVal val="1+#ppt_h/2"/>
+                                            <p:strVal val="#ppt_y"/>
                                           </p:val>
                                         </p:tav>
                                         <p:tav tm="100000">
@@ -22559,7 +22559,7 @@
                                 </p:cTn>
                               </p:par>
                               <p:par>
-                                <p:cTn id="123" presetID="2" presetClass="entr" presetSubtype="4" fill="hold" grpId="0" nodeType="withEffect">
+                                <p:cTn id="123" presetID="2" presetClass="entr" presetSubtype="8" fill="hold" grpId="0" nodeType="withEffect">
                                   <p:stCondLst>
                                     <p:cond delay="0"/>
                                   </p:stCondLst>
@@ -22603,7 +22603,7 @@
                                       <p:tavLst>
                                         <p:tav tm="0">
                                           <p:val>
-                                            <p:strVal val="#ppt_x"/>
+                                            <p:strVal val="0-#ppt_w/2"/>
                                           </p:val>
                                         </p:tav>
                                         <p:tav tm="100000">
@@ -22630,7 +22630,7 @@
                                       <p:tavLst>
                                         <p:tav tm="0">
                                           <p:val>
-                                            <p:strVal val="1+#ppt_h/2"/>
+                                            <p:strVal val="#ppt_y"/>
                                           </p:val>
                                         </p:tav>
                                         <p:tav tm="100000">
@@ -22644,7 +22644,7 @@
                                 </p:cTn>
                               </p:par>
                               <p:par>
-                                <p:cTn id="127" presetID="2" presetClass="entr" presetSubtype="4" fill="hold" grpId="0" nodeType="withEffect">
+                                <p:cTn id="127" presetID="2" presetClass="entr" presetSubtype="8" fill="hold" grpId="0" nodeType="withEffect">
                                   <p:stCondLst>
                                     <p:cond delay="0"/>
                                   </p:stCondLst>
@@ -22688,7 +22688,7 @@
                                       <p:tavLst>
                                         <p:tav tm="0">
                                           <p:val>
-                                            <p:strVal val="#ppt_x"/>
+                                            <p:strVal val="0-#ppt_w/2"/>
                                           </p:val>
                                         </p:tav>
                                         <p:tav tm="100000">
@@ -22715,7 +22715,7 @@
                                       <p:tavLst>
                                         <p:tav tm="0">
                                           <p:val>
-                                            <p:strVal val="1+#ppt_h/2"/>
+                                            <p:strVal val="#ppt_y"/>
                                           </p:val>
                                         </p:tav>
                                         <p:tav tm="100000">
@@ -22729,7 +22729,7 @@
                                 </p:cTn>
                               </p:par>
                               <p:par>
-                                <p:cTn id="131" presetID="2" presetClass="entr" presetSubtype="4" fill="hold" grpId="0" nodeType="withEffect">
+                                <p:cTn id="131" presetID="2" presetClass="entr" presetSubtype="8" fill="hold" grpId="0" nodeType="withEffect">
                                   <p:stCondLst>
                                     <p:cond delay="0"/>
                                   </p:stCondLst>
@@ -22773,7 +22773,7 @@
                                       <p:tavLst>
                                         <p:tav tm="0">
                                           <p:val>
-                                            <p:strVal val="#ppt_x"/>
+                                            <p:strVal val="0-#ppt_w/2"/>
                                           </p:val>
                                         </p:tav>
                                         <p:tav tm="100000">
@@ -22800,7 +22800,7 @@
                                       <p:tavLst>
                                         <p:tav tm="0">
                                           <p:val>
-                                            <p:strVal val="1+#ppt_h/2"/>
+                                            <p:strVal val="#ppt_y"/>
                                           </p:val>
                                         </p:tav>
                                         <p:tav tm="100000">
@@ -22814,7 +22814,7 @@
                                 </p:cTn>
                               </p:par>
                               <p:par>
-                                <p:cTn id="135" presetID="2" presetClass="entr" presetSubtype="4" fill="hold" grpId="0" nodeType="withEffect">
+                                <p:cTn id="135" presetID="2" presetClass="entr" presetSubtype="8" fill="hold" grpId="0" nodeType="withEffect">
                                   <p:stCondLst>
                                     <p:cond delay="0"/>
                                   </p:stCondLst>
@@ -22858,7 +22858,7 @@
                                       <p:tavLst>
                                         <p:tav tm="0">
                                           <p:val>
-                                            <p:strVal val="#ppt_x"/>
+                                            <p:strVal val="0-#ppt_w/2"/>
                                           </p:val>
                                         </p:tav>
                                         <p:tav tm="100000">
@@ -22885,7 +22885,7 @@
                                       <p:tavLst>
                                         <p:tav tm="0">
                                           <p:val>
-                                            <p:strVal val="1+#ppt_h/2"/>
+                                            <p:strVal val="#ppt_y"/>
                                           </p:val>
                                         </p:tav>
                                         <p:tav tm="100000">
@@ -22999,7 +22999,7 @@
         </p:nvSpPr>
         <p:spPr>
           <a:xfrm>
-            <a:off x="6723837" y="1663353"/>
+            <a:off x="6685737" y="1888629"/>
             <a:ext cx="4185618" cy="576262"/>
           </a:xfrm>
         </p:spPr>
@@ -23033,7 +23033,7 @@
         </p:nvSpPr>
         <p:spPr>
           <a:xfrm>
-            <a:off x="6723837" y="2539184"/>
+            <a:off x="6685737" y="2764460"/>
             <a:ext cx="4185617" cy="3561177"/>
           </a:xfrm>
         </p:spPr>
@@ -23096,8 +23096,8 @@
         </p:blipFill>
         <p:spPr>
           <a:xfrm>
-            <a:off x="742032" y="1735621"/>
-            <a:ext cx="4903393" cy="4863961"/>
+            <a:off x="723441" y="1951484"/>
+            <a:ext cx="4655823" cy="4618382"/>
           </a:xfrm>
           <a:prstGeom prst="rect">
             <a:avLst/>
@@ -26971,7 +26971,7 @@
         </p:blipFill>
         <p:spPr>
           <a:xfrm>
-            <a:off x="1222192" y="1131994"/>
+            <a:off x="1222192" y="1118742"/>
             <a:ext cx="9749492" cy="4590386"/>
           </a:xfrm>
           <a:prstGeom prst="rect">
@@ -29917,6 +29917,14 @@
 </file>
 
 <file path=customXml/item1.xml><?xml version="1.0" encoding="utf-8"?>
+<p:properties xmlns:p="http://schemas.microsoft.com/office/2006/metadata/properties" xmlns:xsi="http://www.w3.org/2001/XMLSchema-instance" xmlns:pc="http://schemas.microsoft.com/office/infopath/2007/PartnerControls">
+  <documentManagement>
+    <MediaServiceKeyPoints xmlns="71af3243-3dd4-4a8d-8c0d-dd76da1f02a5" xsi:nil="true"/>
+  </documentManagement>
+</p:properties>
+</file>
+
+<file path=customXml/item2.xml><?xml version="1.0" encoding="utf-8"?>
 <ct:contentTypeSchema xmlns:ct="http://schemas.microsoft.com/office/2006/metadata/contentType" xmlns:ma="http://schemas.microsoft.com/office/2006/metadata/properties/metaAttributes" ct:_="" ma:_="" ma:contentTypeName="Document" ma:contentTypeID="0x01010079F111ED35F8CC479449609E8A0923A6" ma:contentTypeVersion="11" ma:contentTypeDescription="Create a new document." ma:contentTypeScope="" ma:versionID="9677210f24a1be23c92c90fd886aa0aa">
   <xsd:schema xmlns:xsd="http://www.w3.org/2001/XMLSchema" xmlns:xs="http://www.w3.org/2001/XMLSchema" xmlns:p="http://schemas.microsoft.com/office/2006/metadata/properties" xmlns:ns2="71af3243-3dd4-4a8d-8c0d-dd76da1f02a5" xmlns:ns3="16c05727-aa75-4e4a-9b5f-8a80a1165891" targetNamespace="http://schemas.microsoft.com/office/2006/metadata/properties" ma:root="true" ma:fieldsID="60e05723c5c1908df1a1a4ebf11d344e" ns2:_="" ns3:_="">
     <xsd:import namespace="71af3243-3dd4-4a8d-8c0d-dd76da1f02a5"/>
@@ -30127,14 +30135,6 @@
 </ct:contentTypeSchema>
 </file>
 
-<file path=customXml/item2.xml><?xml version="1.0" encoding="utf-8"?>
-<p:properties xmlns:p="http://schemas.microsoft.com/office/2006/metadata/properties" xmlns:xsi="http://www.w3.org/2001/XMLSchema-instance" xmlns:pc="http://schemas.microsoft.com/office/infopath/2007/PartnerControls">
-  <documentManagement>
-    <MediaServiceKeyPoints xmlns="71af3243-3dd4-4a8d-8c0d-dd76da1f02a5" xsi:nil="true"/>
-  </documentManagement>
-</p:properties>
-</file>
-
 <file path=customXml/item3.xml><?xml version="1.0" encoding="utf-8"?>
 <?mso-contentType ?>
 <FormTemplates xmlns="http://schemas.microsoft.com/sharepoint/v3/contenttype/forms">
@@ -30145,6 +30145,23 @@
 </file>
 
 <file path=customXml/itemProps1.xml><?xml version="1.0" encoding="utf-8"?>
+<ds:datastoreItem xmlns:ds="http://schemas.openxmlformats.org/officeDocument/2006/customXml" ds:itemID="{CC24F515-356D-4532-BE08-F6D7771916F0}">
+  <ds:schemaRefs>
+    <ds:schemaRef ds:uri="http://purl.org/dc/elements/1.1/"/>
+    <ds:schemaRef ds:uri="http://schemas.microsoft.com/office/2006/metadata/properties"/>
+    <ds:schemaRef ds:uri="http://schemas.microsoft.com/office/2006/documentManagement/types"/>
+    <ds:schemaRef ds:uri="http://schemas.openxmlformats.org/package/2006/metadata/core-properties"/>
+    <ds:schemaRef ds:uri="16c05727-aa75-4e4a-9b5f-8a80a1165891"/>
+    <ds:schemaRef ds:uri="http://purl.org/dc/dcmitype/"/>
+    <ds:schemaRef ds:uri="http://schemas.microsoft.com/office/infopath/2007/PartnerControls"/>
+    <ds:schemaRef ds:uri="71af3243-3dd4-4a8d-8c0d-dd76da1f02a5"/>
+    <ds:schemaRef ds:uri="http://www.w3.org/XML/1998/namespace"/>
+    <ds:schemaRef ds:uri="http://purl.org/dc/terms/"/>
+  </ds:schemaRefs>
+</ds:datastoreItem>
+</file>
+
+<file path=customXml/itemProps2.xml><?xml version="1.0" encoding="utf-8"?>
 <ds:datastoreItem xmlns:ds="http://schemas.openxmlformats.org/officeDocument/2006/customXml" ds:itemID="{83E04B51-1D33-4F14-BBD7-79D7D27E2EE4}">
   <ds:schemaRefs>
     <ds:schemaRef ds:uri="http://schemas.microsoft.com/office/2006/metadata/contentType"/>
@@ -30163,23 +30180,6 @@
 </ds:datastoreItem>
 </file>
 
-<file path=customXml/itemProps2.xml><?xml version="1.0" encoding="utf-8"?>
-<ds:datastoreItem xmlns:ds="http://schemas.openxmlformats.org/officeDocument/2006/customXml" ds:itemID="{CC24F515-356D-4532-BE08-F6D7771916F0}">
-  <ds:schemaRefs>
-    <ds:schemaRef ds:uri="http://schemas.microsoft.com/office/2006/metadata/properties"/>
-    <ds:schemaRef ds:uri="http://schemas.openxmlformats.org/package/2006/metadata/core-properties"/>
-    <ds:schemaRef ds:uri="16c05727-aa75-4e4a-9b5f-8a80a1165891"/>
-    <ds:schemaRef ds:uri="http://purl.org/dc/terms/"/>
-    <ds:schemaRef ds:uri="http://purl.org/dc/dcmitype/"/>
-    <ds:schemaRef ds:uri="http://schemas.microsoft.com/office/2006/documentManagement/types"/>
-    <ds:schemaRef ds:uri="http://purl.org/dc/elements/1.1/"/>
-    <ds:schemaRef ds:uri="http://schemas.microsoft.com/office/infopath/2007/PartnerControls"/>
-    <ds:schemaRef ds:uri="71af3243-3dd4-4a8d-8c0d-dd76da1f02a5"/>
-    <ds:schemaRef ds:uri="http://www.w3.org/XML/1998/namespace"/>
-  </ds:schemaRefs>
-</ds:datastoreItem>
-</file>
-
 <file path=customXml/itemProps3.xml><?xml version="1.0" encoding="utf-8"?>
 <ds:datastoreItem xmlns:ds="http://schemas.openxmlformats.org/officeDocument/2006/customXml" ds:itemID="{9AEF1282-A6E9-4912-8AB9-8ED69BF7097D}">
   <ds:schemaRefs>

</xml_diff>